<commit_message>
Added slides for trees
</commit_message>
<xml_diff>
--- a/5 - Sorting Algorithms/Counting Sort.pptx
+++ b/5 - Sorting Algorithms/Counting Sort.pptx
@@ -209,7 +209,7 @@
           <a:p>
             <a:fld id="{F666E1FD-E7A0-497B-BBC0-740BAAC97C64}" type="datetimeFigureOut">
               <a:rPr lang="en-PH" smtClean="0"/>
-              <a:t>9/18/23</a:t>
+              <a:t>9/19/23</a:t>
             </a:fld>
             <a:endParaRPr lang="en-PH"/>
           </a:p>
@@ -1046,7 +1046,7 @@
           <a:p>
             <a:fld id="{0CCF0B81-6BD8-4C65-9459-815598C5F1F4}" type="datetimeFigureOut">
               <a:rPr lang="en-PH" smtClean="0"/>
-              <a:t>9/18/23</a:t>
+              <a:t>9/19/23</a:t>
             </a:fld>
             <a:endParaRPr lang="en-PH"/>
           </a:p>
@@ -1246,7 +1246,7 @@
           <a:p>
             <a:fld id="{0CCF0B81-6BD8-4C65-9459-815598C5F1F4}" type="datetimeFigureOut">
               <a:rPr lang="en-PH" smtClean="0"/>
-              <a:t>9/18/23</a:t>
+              <a:t>9/19/23</a:t>
             </a:fld>
             <a:endParaRPr lang="en-PH"/>
           </a:p>
@@ -1456,7 +1456,7 @@
           <a:p>
             <a:fld id="{0CCF0B81-6BD8-4C65-9459-815598C5F1F4}" type="datetimeFigureOut">
               <a:rPr lang="en-PH" smtClean="0"/>
-              <a:t>9/18/23</a:t>
+              <a:t>9/19/23</a:t>
             </a:fld>
             <a:endParaRPr lang="en-PH"/>
           </a:p>
@@ -1656,7 +1656,7 @@
           <a:p>
             <a:fld id="{0CCF0B81-6BD8-4C65-9459-815598C5F1F4}" type="datetimeFigureOut">
               <a:rPr lang="en-PH" smtClean="0"/>
-              <a:t>9/18/23</a:t>
+              <a:t>9/19/23</a:t>
             </a:fld>
             <a:endParaRPr lang="en-PH"/>
           </a:p>
@@ -1932,7 +1932,7 @@
           <a:p>
             <a:fld id="{0CCF0B81-6BD8-4C65-9459-815598C5F1F4}" type="datetimeFigureOut">
               <a:rPr lang="en-PH" smtClean="0"/>
-              <a:t>9/18/23</a:t>
+              <a:t>9/19/23</a:t>
             </a:fld>
             <a:endParaRPr lang="en-PH"/>
           </a:p>
@@ -2200,7 +2200,7 @@
           <a:p>
             <a:fld id="{0CCF0B81-6BD8-4C65-9459-815598C5F1F4}" type="datetimeFigureOut">
               <a:rPr lang="en-PH" smtClean="0"/>
-              <a:t>9/18/23</a:t>
+              <a:t>9/19/23</a:t>
             </a:fld>
             <a:endParaRPr lang="en-PH"/>
           </a:p>
@@ -2615,7 +2615,7 @@
           <a:p>
             <a:fld id="{0CCF0B81-6BD8-4C65-9459-815598C5F1F4}" type="datetimeFigureOut">
               <a:rPr lang="en-PH" smtClean="0"/>
-              <a:t>9/18/23</a:t>
+              <a:t>9/19/23</a:t>
             </a:fld>
             <a:endParaRPr lang="en-PH"/>
           </a:p>
@@ -2757,7 +2757,7 @@
           <a:p>
             <a:fld id="{0CCF0B81-6BD8-4C65-9459-815598C5F1F4}" type="datetimeFigureOut">
               <a:rPr lang="en-PH" smtClean="0"/>
-              <a:t>9/18/23</a:t>
+              <a:t>9/19/23</a:t>
             </a:fld>
             <a:endParaRPr lang="en-PH"/>
           </a:p>
@@ -2870,7 +2870,7 @@
           <a:p>
             <a:fld id="{0CCF0B81-6BD8-4C65-9459-815598C5F1F4}" type="datetimeFigureOut">
               <a:rPr lang="en-PH" smtClean="0"/>
-              <a:t>9/18/23</a:t>
+              <a:t>9/19/23</a:t>
             </a:fld>
             <a:endParaRPr lang="en-PH"/>
           </a:p>
@@ -3183,7 +3183,7 @@
           <a:p>
             <a:fld id="{0CCF0B81-6BD8-4C65-9459-815598C5F1F4}" type="datetimeFigureOut">
               <a:rPr lang="en-PH" smtClean="0"/>
-              <a:t>9/18/23</a:t>
+              <a:t>9/19/23</a:t>
             </a:fld>
             <a:endParaRPr lang="en-PH"/>
           </a:p>
@@ -3472,7 +3472,7 @@
           <a:p>
             <a:fld id="{0CCF0B81-6BD8-4C65-9459-815598C5F1F4}" type="datetimeFigureOut">
               <a:rPr lang="en-PH" smtClean="0"/>
-              <a:t>9/18/23</a:t>
+              <a:t>9/19/23</a:t>
             </a:fld>
             <a:endParaRPr lang="en-PH"/>
           </a:p>
@@ -3715,7 +3715,7 @@
           <a:p>
             <a:fld id="{0CCF0B81-6BD8-4C65-9459-815598C5F1F4}" type="datetimeFigureOut">
               <a:rPr lang="en-PH" smtClean="0"/>
-              <a:t>9/18/23</a:t>
+              <a:t>9/19/23</a:t>
             </a:fld>
             <a:endParaRPr lang="en-PH"/>
           </a:p>
@@ -11155,13 +11155,22 @@
           <a:p>
             <a:pPr algn="l" fontAlgn="base"/>
             <a:r>
-              <a:rPr lang="en-US" sz="2400" b="1" dirty="0">
+              <a:rPr lang="en-US" sz="2400" b="1">
                 <a:solidFill>
                   <a:srgbClr val="273239"/>
                 </a:solidFill>
                 <a:latin typeface="Calibri Body"/>
               </a:rPr>
-              <a:t>Step 2</a:t>
+              <a:t>Step 3</a:t>
+            </a:r>
+            <a:r>
+              <a:rPr lang="en-US" sz="2400">
+                <a:solidFill>
+                  <a:srgbClr val="273239"/>
+                </a:solidFill>
+                <a:latin typeface="Calibri Body"/>
+              </a:rPr>
+              <a:t>: </a:t>
             </a:r>
             <a:r>
               <a:rPr lang="en-US" sz="2400" dirty="0">
@@ -11170,7 +11179,7 @@
                 </a:solidFill>
                 <a:latin typeface="Calibri Body"/>
               </a:rPr>
-              <a:t>: Starting from right to left from the </a:t>
+              <a:t>Starting from right to left from the </a:t>
             </a:r>
             <a:r>
               <a:rPr lang="en-US" sz="2400" b="1" dirty="0">
@@ -13586,12 +13595,9 @@
 </file>
 
 <file path=customXml/item1.xml><?xml version="1.0" encoding="utf-8"?>
-<?mso-contentType ?>
-<FormTemplates xmlns="http://schemas.microsoft.com/sharepoint/v3/contenttype/forms">
-  <Display>DocumentLibraryForm</Display>
-  <Edit>DocumentLibraryForm</Edit>
-  <New>DocumentLibraryForm</New>
-</FormTemplates>
+<p:properties xmlns:p="http://schemas.microsoft.com/office/2006/metadata/properties" xmlns:xsi="http://www.w3.org/2001/XMLSchema-instance" xmlns:pc="http://schemas.microsoft.com/office/infopath/2007/PartnerControls">
+  <documentManagement/>
+</p:properties>
 </file>
 
 <file path=customXml/item2.xml><?xml version="1.0" encoding="utf-8"?>
@@ -13727,15 +13733,19 @@
 </file>
 
 <file path=customXml/item3.xml><?xml version="1.0" encoding="utf-8"?>
-<p:properties xmlns:p="http://schemas.microsoft.com/office/2006/metadata/properties" xmlns:xsi="http://www.w3.org/2001/XMLSchema-instance" xmlns:pc="http://schemas.microsoft.com/office/infopath/2007/PartnerControls">
-  <documentManagement/>
-</p:properties>
+<?mso-contentType ?>
+<FormTemplates xmlns="http://schemas.microsoft.com/sharepoint/v3/contenttype/forms">
+  <Display>DocumentLibraryForm</Display>
+  <Edit>DocumentLibraryForm</Edit>
+  <New>DocumentLibraryForm</New>
+</FormTemplates>
 </file>
 
 <file path=customXml/itemProps1.xml><?xml version="1.0" encoding="utf-8"?>
-<ds:datastoreItem xmlns:ds="http://schemas.openxmlformats.org/officeDocument/2006/customXml" ds:itemID="{651370AF-26B9-4AFA-BA9D-5D4A7E1A6722}">
+<ds:datastoreItem xmlns:ds="http://schemas.openxmlformats.org/officeDocument/2006/customXml" ds:itemID="{EA3362E2-FA54-4262-AE94-2FA98FF8142D}">
   <ds:schemaRefs>
-    <ds:schemaRef ds:uri="http://schemas.microsoft.com/sharepoint/v3/contenttype/forms"/>
+    <ds:schemaRef ds:uri="http://schemas.microsoft.com/office/2006/metadata/properties"/>
+    <ds:schemaRef ds:uri="http://schemas.microsoft.com/office/infopath/2007/PartnerControls"/>
   </ds:schemaRefs>
 </ds:datastoreItem>
 </file>
@@ -13759,10 +13769,9 @@
 </file>
 
 <file path=customXml/itemProps3.xml><?xml version="1.0" encoding="utf-8"?>
-<ds:datastoreItem xmlns:ds="http://schemas.openxmlformats.org/officeDocument/2006/customXml" ds:itemID="{EA3362E2-FA54-4262-AE94-2FA98FF8142D}">
+<ds:datastoreItem xmlns:ds="http://schemas.openxmlformats.org/officeDocument/2006/customXml" ds:itemID="{651370AF-26B9-4AFA-BA9D-5D4A7E1A6722}">
   <ds:schemaRefs>
-    <ds:schemaRef ds:uri="http://schemas.microsoft.com/office/2006/metadata/properties"/>
-    <ds:schemaRef ds:uri="http://schemas.microsoft.com/office/infopath/2007/PartnerControls"/>
+    <ds:schemaRef ds:uri="http://schemas.microsoft.com/sharepoint/v3/contenttype/forms"/>
   </ds:schemaRefs>
 </ds:datastoreItem>
 </file>
</xml_diff>